<commit_message>
now with updated code snips!
</commit_message>
<xml_diff>
--- a/Time Tracking solutions.pptx
+++ b/Time Tracking solutions.pptx
@@ -1188,7 +1188,7 @@
           <a:p>
             <a:fld id="{1A9BCE0C-CD74-4A59-802C-6D2F8C15331A}" type="datetimeFigureOut">
               <a:rPr lang="en-US" smtClean="0"/>
-              <a:t>5/8/2017</a:t>
+              <a:t>5/10/2017</a:t>
             </a:fld>
             <a:endParaRPr lang="en-US"/>
           </a:p>
@@ -1353,7 +1353,7 @@
           <a:p>
             <a:fld id="{F04FDEA8-CBB8-46CC-9562-028963DBC55A}" type="datetimeFigureOut">
               <a:rPr lang="en-US" smtClean="0"/>
-              <a:t>5/8/2017</a:t>
+              <a:t>5/10/2017</a:t>
             </a:fld>
             <a:endParaRPr lang="en-US"/>
           </a:p>
@@ -2912,7 +2912,7 @@
           <a:p>
             <a:fld id="{37CC0096-1860-4642-9CD2-0079EA5E7CD1}" type="datetimeFigureOut">
               <a:rPr lang="en-US" smtClean="0"/>
-              <a:t>5/8/2017</a:t>
+              <a:t>5/10/2017</a:t>
             </a:fld>
             <a:endParaRPr lang="en-US"/>
           </a:p>
@@ -3102,7 +3102,7 @@
           <a:p>
             <a:fld id="{37CC0096-1860-4642-9CD2-0079EA5E7CD1}" type="datetimeFigureOut">
               <a:rPr lang="en-US" smtClean="0"/>
-              <a:t>5/8/2017</a:t>
+              <a:t>5/10/2017</a:t>
             </a:fld>
             <a:endParaRPr lang="en-US"/>
           </a:p>
@@ -3681,7 +3681,7 @@
           <a:p>
             <a:fld id="{37CC0096-1860-4642-9CD2-0079EA5E7CD1}" type="datetimeFigureOut">
               <a:rPr lang="en-US" smtClean="0"/>
-              <a:t>5/8/2017</a:t>
+              <a:t>5/10/2017</a:t>
             </a:fld>
             <a:endParaRPr lang="en-US"/>
           </a:p>
@@ -4192,7 +4192,7 @@
           <a:p>
             <a:fld id="{37CC0096-1860-4642-9CD2-0079EA5E7CD1}" type="datetimeFigureOut">
               <a:rPr lang="en-US" smtClean="0"/>
-              <a:t>5/8/2017</a:t>
+              <a:t>5/10/2017</a:t>
             </a:fld>
             <a:endParaRPr lang="en-US"/>
           </a:p>
@@ -4639,7 +4639,7 @@
           <a:p>
             <a:fld id="{37CC0096-1860-4642-9CD2-0079EA5E7CD1}" type="datetimeFigureOut">
               <a:rPr lang="en-US" smtClean="0"/>
-              <a:t>5/8/2017</a:t>
+              <a:t>5/10/2017</a:t>
             </a:fld>
             <a:endParaRPr lang="en-US"/>
           </a:p>
@@ -4768,7 +4768,7 @@
           <a:p>
             <a:fld id="{37CC0096-1860-4642-9CD2-0079EA5E7CD1}" type="datetimeFigureOut">
               <a:rPr lang="en-US" smtClean="0"/>
-              <a:t>5/8/2017</a:t>
+              <a:t>5/10/2017</a:t>
             </a:fld>
             <a:endParaRPr lang="en-US"/>
           </a:p>
@@ -5106,7 +5106,7 @@
           <a:p>
             <a:fld id="{37CC0096-1860-4642-9CD2-0079EA5E7CD1}" type="datetimeFigureOut">
               <a:rPr lang="en-US" smtClean="0"/>
-              <a:t>5/8/2017</a:t>
+              <a:t>5/10/2017</a:t>
             </a:fld>
             <a:endParaRPr lang="en-US"/>
           </a:p>
@@ -5373,7 +5373,7 @@
             <a:fld id="{37CC0096-1860-4642-9CD2-0079EA5E7CD1}" type="datetimeFigureOut">
               <a:rPr lang="en-US" smtClean="0"/>
               <a:pPr/>
-              <a:t>5/8/2017</a:t>
+              <a:t>5/10/2017</a:t>
             </a:fld>
             <a:endParaRPr lang="en-US"/>
           </a:p>
@@ -7280,14 +7280,7 @@
                 <a:latin typeface="Courier New" panose="02070309020205020404" pitchFamily="49" charset="0"/>
                 <a:cs typeface="Courier New" panose="02070309020205020404" pitchFamily="49" charset="0"/>
               </a:rPr>
-              <a:t>  // we want to output a 1 if "someone is there" and a 0 if "no one is there"  </a:t>
-            </a:r>
-            <a:r>
-              <a:rPr lang="en-US" dirty="0">
-                <a:latin typeface="Courier New" panose="02070309020205020404" pitchFamily="49" charset="0"/>
-                <a:cs typeface="Courier New" panose="02070309020205020404" pitchFamily="49" charset="0"/>
-              </a:rPr>
-              <a:t> </a:t>
+              <a:t>  // we want to output a 1 if "someone is there" and a 0 if "no one is there"   </a:t>
             </a:r>
             <a:r>
               <a:rPr lang="en-US" dirty="0" err="1">
@@ -7725,13 +7718,64 @@
                 <a:latin typeface="Courier New" panose="02070309020205020404" pitchFamily="49" charset="0"/>
                 <a:cs typeface="Courier New" panose="02070309020205020404" pitchFamily="49" charset="0"/>
               </a:rPr>
-              <a:t>output = String(month(startTime)) + "/" + String(day(startTime)) + "/" + \ String(year(startTime)) + " " + String(hour(startTime)) + ":" + \ String(minute(startTime)) + " : " + String(duration) + "\n";   </a:t>
-            </a:r>
-          </a:p>
-          <a:p>
-            <a:pPr marL="365760" lvl="1" indent="0">
-              <a:buNone/>
-            </a:pPr>
+              <a:t>output = months[month(</a:t>
+            </a:r>
+            <a:r>
+              <a:rPr lang="en-US" dirty="0" err="1">
+                <a:latin typeface="Courier New" panose="02070309020205020404" pitchFamily="49" charset="0"/>
+                <a:cs typeface="Courier New" panose="02070309020205020404" pitchFamily="49" charset="0"/>
+              </a:rPr>
+              <a:t>startTime</a:t>
+            </a:r>
+            <a:r>
+              <a:rPr lang="en-US" dirty="0">
+                <a:latin typeface="Courier New" panose="02070309020205020404" pitchFamily="49" charset="0"/>
+                <a:cs typeface="Courier New" panose="02070309020205020404" pitchFamily="49" charset="0"/>
+              </a:rPr>
+              <a:t>)] + " " + String(day(</a:t>
+            </a:r>
+            <a:r>
+              <a:rPr lang="en-US" dirty="0" err="1">
+                <a:latin typeface="Courier New" panose="02070309020205020404" pitchFamily="49" charset="0"/>
+                <a:cs typeface="Courier New" panose="02070309020205020404" pitchFamily="49" charset="0"/>
+              </a:rPr>
+              <a:t>startTime</a:t>
+            </a:r>
+            <a:r>
+              <a:rPr lang="en-US" dirty="0">
+                <a:latin typeface="Courier New" panose="02070309020205020404" pitchFamily="49" charset="0"/>
+                <a:cs typeface="Courier New" panose="02070309020205020404" pitchFamily="49" charset="0"/>
+              </a:rPr>
+              <a:t>)) + " " + \             	     String(hour(</a:t>
+            </a:r>
+            <a:r>
+              <a:rPr lang="en-US" dirty="0" err="1">
+                <a:latin typeface="Courier New" panose="02070309020205020404" pitchFamily="49" charset="0"/>
+                <a:cs typeface="Courier New" panose="02070309020205020404" pitchFamily="49" charset="0"/>
+              </a:rPr>
+              <a:t>startTime</a:t>
+            </a:r>
+            <a:r>
+              <a:rPr lang="en-US" dirty="0">
+                <a:latin typeface="Courier New" panose="02070309020205020404" pitchFamily="49" charset="0"/>
+                <a:cs typeface="Courier New" panose="02070309020205020404" pitchFamily="49" charset="0"/>
+              </a:rPr>
+              <a:t>)) + ":" + String(minute(</a:t>
+            </a:r>
+            <a:r>
+              <a:rPr lang="en-US" dirty="0" err="1">
+                <a:latin typeface="Courier New" panose="02070309020205020404" pitchFamily="49" charset="0"/>
+                <a:cs typeface="Courier New" panose="02070309020205020404" pitchFamily="49" charset="0"/>
+              </a:rPr>
+              <a:t>startTime</a:t>
+            </a:r>
+            <a:r>
+              <a:rPr lang="en-US" dirty="0">
+                <a:latin typeface="Courier New" panose="02070309020205020404" pitchFamily="49" charset="0"/>
+                <a:cs typeface="Courier New" panose="02070309020205020404" pitchFamily="49" charset="0"/>
+              </a:rPr>
+              <a:t>)) + " " \ + 		     String(duration) + " mins\n";</a:t>
+            </a:r>
             <a:r>
               <a:rPr lang="en-US" dirty="0">
                 <a:latin typeface="Courier New" panose="02070309020205020404" pitchFamily="49" charset="0"/>
@@ -7744,18 +7788,7 @@
             <a:pPr marL="365760" lvl="1" indent="0">
               <a:buNone/>
             </a:pPr>
-            <a:r>
-              <a:rPr lang="en-US" dirty="0">
-                <a:cs typeface="Courier New" panose="02070309020205020404" pitchFamily="49" charset="0"/>
-              </a:rPr>
-              <a:t>&lt;snip!&gt;</a:t>
-            </a:r>
-          </a:p>
-          <a:p>
-            <a:pPr marL="365760" lvl="1" indent="0">
-              <a:buNone/>
-            </a:pPr>
-            <a:endParaRPr lang="en-US">
+            <a:endParaRPr lang="en-US" dirty="0">
               <a:latin typeface="Courier New" panose="02070309020205020404" pitchFamily="49" charset="0"/>
               <a:cs typeface="Courier New" panose="02070309020205020404" pitchFamily="49" charset="0"/>
             </a:endParaRPr>
@@ -7764,25 +7797,39 @@
             <a:pPr marL="365760" lvl="1" indent="0">
               <a:buNone/>
             </a:pPr>
-            <a:r>
-              <a:rPr lang="en-US">
-                <a:latin typeface="Courier New" panose="02070309020205020404" pitchFamily="49" charset="0"/>
-                <a:cs typeface="Courier New" panose="02070309020205020404" pitchFamily="49" charset="0"/>
-              </a:rPr>
-              <a:t>delay(3000</a:t>
-            </a:r>
             <a:r>
               <a:rPr lang="en-US" dirty="0">
                 <a:latin typeface="Courier New" panose="02070309020205020404" pitchFamily="49" charset="0"/>
                 <a:cs typeface="Courier New" panose="02070309020205020404" pitchFamily="49" charset="0"/>
               </a:rPr>
-              <a:t>);    </a:t>
+              <a:t> </a:t>
+            </a:r>
+            <a:r>
+              <a:rPr lang="en-US" dirty="0" err="1">
+                <a:latin typeface="Courier New" panose="02070309020205020404" pitchFamily="49" charset="0"/>
+                <a:cs typeface="Courier New" panose="02070309020205020404" pitchFamily="49" charset="0"/>
+              </a:rPr>
+              <a:t>Serial.println</a:t>
+            </a:r>
+            <a:r>
+              <a:rPr lang="en-US" dirty="0">
+                <a:latin typeface="Courier New" panose="02070309020205020404" pitchFamily="49" charset="0"/>
+                <a:cs typeface="Courier New" panose="02070309020205020404" pitchFamily="49" charset="0"/>
+              </a:rPr>
+              <a:t>(output);</a:t>
             </a:r>
           </a:p>
           <a:p>
             <a:pPr marL="365760" lvl="1" indent="0">
               <a:buNone/>
             </a:pPr>
+            <a:r>
+              <a:rPr lang="en-US" dirty="0">
+                <a:latin typeface="Courier New" panose="02070309020205020404" pitchFamily="49" charset="0"/>
+                <a:cs typeface="Courier New" panose="02070309020205020404" pitchFamily="49" charset="0"/>
+              </a:rPr>
+              <a:t> </a:t>
+            </a:r>
             <a:r>
               <a:rPr lang="en-US" dirty="0" err="1">
                 <a:latin typeface="Courier New" panose="02070309020205020404" pitchFamily="49" charset="0"/>
@@ -7807,8 +7854,12 @@
                 <a:latin typeface="Courier New" panose="02070309020205020404" pitchFamily="49" charset="0"/>
                 <a:cs typeface="Courier New" panose="02070309020205020404" pitchFamily="49" charset="0"/>
               </a:rPr>
-              <a:t>delay(3000);</a:t>
-            </a:r>
+              <a:t> delay(500);</a:t>
+            </a:r>
+            <a:endParaRPr lang="en-US" dirty="0">
+              <a:latin typeface="Courier New" panose="02070309020205020404" pitchFamily="49" charset="0"/>
+              <a:cs typeface="Courier New" panose="02070309020205020404" pitchFamily="49" charset="0"/>
+            </a:endParaRPr>
           </a:p>
         </p:txBody>
       </p:sp>

</xml_diff>